<commit_message>
updated Response Data docs and slides
</commit_message>
<xml_diff>
--- a/module-1/01-12 Formatting Reponse Data in your API/01-12 Formatting Response Data in your API.pptx
+++ b/module-1/01-12 Formatting Reponse Data in your API/01-12 Formatting Response Data in your API.pptx
@@ -4114,7 +4114,7 @@
           <a:p>
             <a:fld id="{FB017F78-98C7-485A-9214-AE5F1D7C967C}" type="datetimeFigureOut">
               <a:rPr lang="en-US" smtClean="0"/>
-              <a:t>9/27/2021</a:t>
+              <a:t>9/28/2021</a:t>
             </a:fld>
             <a:endParaRPr lang="en-US"/>
           </a:p>
@@ -4819,7 +4819,7 @@
           <a:p>
             <a:fld id="{D088F999-7A4E-6B4F-9FED-EF75B73AD044}" type="datetimeFigureOut">
               <a:rPr lang="en-US" smtClean="0"/>
-              <a:t>9/27/2021</a:t>
+              <a:t>9/28/2021</a:t>
             </a:fld>
             <a:endParaRPr lang="en-US"/>
           </a:p>
@@ -4987,7 +4987,7 @@
           <a:p>
             <a:fld id="{D088F999-7A4E-6B4F-9FED-EF75B73AD044}" type="datetimeFigureOut">
               <a:rPr lang="en-US" smtClean="0"/>
-              <a:t>9/27/2021</a:t>
+              <a:t>9/28/2021</a:t>
             </a:fld>
             <a:endParaRPr lang="en-US"/>
           </a:p>
@@ -5165,7 +5165,7 @@
           <a:p>
             <a:fld id="{D088F999-7A4E-6B4F-9FED-EF75B73AD044}" type="datetimeFigureOut">
               <a:rPr lang="en-US" smtClean="0"/>
-              <a:t>9/27/2021</a:t>
+              <a:t>9/28/2021</a:t>
             </a:fld>
             <a:endParaRPr lang="en-US"/>
           </a:p>
@@ -5454,7 +5454,7 @@
           <a:p>
             <a:fld id="{7C2D2CC9-D6D0-4DE1-ABB1-105EB7BE20AD}" type="datetimeFigureOut">
               <a:rPr lang="en-US" smtClean="0"/>
-              <a:t>9/27/2021</a:t>
+              <a:t>9/28/2021</a:t>
             </a:fld>
             <a:endParaRPr lang="en-US"/>
           </a:p>
@@ -5662,7 +5662,7 @@
           <a:p>
             <a:fld id="{7C2D2CC9-D6D0-4DE1-ABB1-105EB7BE20AD}" type="datetimeFigureOut">
               <a:rPr lang="en-US" smtClean="0"/>
-              <a:t>9/27/2021</a:t>
+              <a:t>9/28/2021</a:t>
             </a:fld>
             <a:endParaRPr lang="en-US"/>
           </a:p>
@@ -5999,7 +5999,7 @@
           <a:p>
             <a:fld id="{7C2D2CC9-D6D0-4DE1-ABB1-105EB7BE20AD}" type="datetimeFigureOut">
               <a:rPr lang="en-US" smtClean="0"/>
-              <a:t>9/27/2021</a:t>
+              <a:t>9/28/2021</a:t>
             </a:fld>
             <a:endParaRPr lang="en-US"/>
           </a:p>
@@ -6274,7 +6274,7 @@
           <a:p>
             <a:fld id="{7C2D2CC9-D6D0-4DE1-ABB1-105EB7BE20AD}" type="datetimeFigureOut">
               <a:rPr lang="en-US" smtClean="0"/>
-              <a:t>9/27/2021</a:t>
+              <a:t>9/28/2021</a:t>
             </a:fld>
             <a:endParaRPr lang="en-US"/>
           </a:p>
@@ -6657,7 +6657,7 @@
           <a:p>
             <a:fld id="{7C2D2CC9-D6D0-4DE1-ABB1-105EB7BE20AD}" type="datetimeFigureOut">
               <a:rPr lang="en-US" smtClean="0"/>
-              <a:t>9/27/2021</a:t>
+              <a:t>9/28/2021</a:t>
             </a:fld>
             <a:endParaRPr lang="en-US"/>
           </a:p>
@@ -6775,7 +6775,7 @@
           <a:p>
             <a:fld id="{7C2D2CC9-D6D0-4DE1-ABB1-105EB7BE20AD}" type="datetimeFigureOut">
               <a:rPr lang="en-US" smtClean="0"/>
-              <a:t>9/27/2021</a:t>
+              <a:t>9/28/2021</a:t>
             </a:fld>
             <a:endParaRPr lang="en-US"/>
           </a:p>
@@ -6948,7 +6948,7 @@
           <a:p>
             <a:fld id="{7C2D2CC9-D6D0-4DE1-ABB1-105EB7BE20AD}" type="datetimeFigureOut">
               <a:rPr lang="en-US" smtClean="0"/>
-              <a:t>9/27/2021</a:t>
+              <a:t>9/28/2021</a:t>
             </a:fld>
             <a:endParaRPr lang="en-US"/>
           </a:p>
@@ -7304,7 +7304,7 @@
           <a:p>
             <a:fld id="{7C2D2CC9-D6D0-4DE1-ABB1-105EB7BE20AD}" type="datetimeFigureOut">
               <a:rPr lang="en-US" smtClean="0"/>
-              <a:t>9/27/2021</a:t>
+              <a:t>9/28/2021</a:t>
             </a:fld>
             <a:endParaRPr lang="en-US"/>
           </a:p>
@@ -7493,7 +7493,7 @@
           <a:p>
             <a:fld id="{D088F999-7A4E-6B4F-9FED-EF75B73AD044}" type="datetimeFigureOut">
               <a:rPr lang="en-US" smtClean="0"/>
-              <a:t>9/27/2021</a:t>
+              <a:t>9/28/2021</a:t>
             </a:fld>
             <a:endParaRPr lang="en-US"/>
           </a:p>
@@ -7820,7 +7820,7 @@
           <a:p>
             <a:fld id="{7C2D2CC9-D6D0-4DE1-ABB1-105EB7BE20AD}" type="datetimeFigureOut">
               <a:rPr lang="en-US" smtClean="0"/>
-              <a:t>9/27/2021</a:t>
+              <a:t>9/28/2021</a:t>
             </a:fld>
             <a:endParaRPr lang="en-US"/>
           </a:p>
@@ -8006,7 +8006,7 @@
           <a:p>
             <a:fld id="{7C2D2CC9-D6D0-4DE1-ABB1-105EB7BE20AD}" type="datetimeFigureOut">
               <a:rPr lang="en-US" smtClean="0"/>
-              <a:t>9/27/2021</a:t>
+              <a:t>9/28/2021</a:t>
             </a:fld>
             <a:endParaRPr lang="en-US"/>
           </a:p>
@@ -8264,7 +8264,7 @@
           <a:p>
             <a:fld id="{7C2D2CC9-D6D0-4DE1-ABB1-105EB7BE20AD}" type="datetimeFigureOut">
               <a:rPr lang="en-US" smtClean="0"/>
-              <a:t>9/27/2021</a:t>
+              <a:t>9/28/2021</a:t>
             </a:fld>
             <a:endParaRPr lang="en-US"/>
           </a:p>
@@ -8509,7 +8509,7 @@
           <a:p>
             <a:fld id="{D088F999-7A4E-6B4F-9FED-EF75B73AD044}" type="datetimeFigureOut">
               <a:rPr lang="en-US" smtClean="0"/>
-              <a:t>9/27/2021</a:t>
+              <a:t>9/28/2021</a:t>
             </a:fld>
             <a:endParaRPr lang="en-US"/>
           </a:p>
@@ -8794,7 +8794,7 @@
           <a:p>
             <a:fld id="{D088F999-7A4E-6B4F-9FED-EF75B73AD044}" type="datetimeFigureOut">
               <a:rPr lang="en-US" smtClean="0"/>
-              <a:t>9/27/2021</a:t>
+              <a:t>9/28/2021</a:t>
             </a:fld>
             <a:endParaRPr lang="en-US"/>
           </a:p>
@@ -9213,7 +9213,7 @@
           <a:p>
             <a:fld id="{D088F999-7A4E-6B4F-9FED-EF75B73AD044}" type="datetimeFigureOut">
               <a:rPr lang="en-US" smtClean="0"/>
-              <a:t>9/27/2021</a:t>
+              <a:t>9/28/2021</a:t>
             </a:fld>
             <a:endParaRPr lang="en-US"/>
           </a:p>
@@ -9330,7 +9330,7 @@
           <a:p>
             <a:fld id="{D088F999-7A4E-6B4F-9FED-EF75B73AD044}" type="datetimeFigureOut">
               <a:rPr lang="en-US" smtClean="0"/>
-              <a:t>9/27/2021</a:t>
+              <a:t>9/28/2021</a:t>
             </a:fld>
             <a:endParaRPr lang="en-US"/>
           </a:p>
@@ -9425,7 +9425,7 @@
           <a:p>
             <a:fld id="{D088F999-7A4E-6B4F-9FED-EF75B73AD044}" type="datetimeFigureOut">
               <a:rPr lang="en-US" smtClean="0"/>
-              <a:t>9/27/2021</a:t>
+              <a:t>9/28/2021</a:t>
             </a:fld>
             <a:endParaRPr lang="en-US"/>
           </a:p>
@@ -9700,7 +9700,7 @@
           <a:p>
             <a:fld id="{D088F999-7A4E-6B4F-9FED-EF75B73AD044}" type="datetimeFigureOut">
               <a:rPr lang="en-US" smtClean="0"/>
-              <a:t>9/27/2021</a:t>
+              <a:t>9/28/2021</a:t>
             </a:fld>
             <a:endParaRPr lang="en-US"/>
           </a:p>
@@ -9952,7 +9952,7 @@
           <a:p>
             <a:fld id="{D088F999-7A4E-6B4F-9FED-EF75B73AD044}" type="datetimeFigureOut">
               <a:rPr lang="en-US" smtClean="0"/>
-              <a:t>9/27/2021</a:t>
+              <a:t>9/28/2021</a:t>
             </a:fld>
             <a:endParaRPr lang="en-US"/>
           </a:p>
@@ -10172,7 +10172,7 @@
           <a:p>
             <a:fld id="{D088F999-7A4E-6B4F-9FED-EF75B73AD044}" type="datetimeFigureOut">
               <a:rPr lang="en-US" smtClean="0"/>
-              <a:t>9/27/2021</a:t>
+              <a:t>9/28/2021</a:t>
             </a:fld>
             <a:endParaRPr lang="en-US"/>
           </a:p>
@@ -10764,7 +10764,7 @@
           <a:p>
             <a:fld id="{D088F999-7A4E-6B4F-9FED-EF75B73AD044}" type="datetimeFigureOut">
               <a:rPr lang="en-US" smtClean="0"/>
-              <a:t>9/27/2021</a:t>
+              <a:t>9/28/2021</a:t>
             </a:fld>
             <a:endParaRPr lang="en-US"/>
           </a:p>
@@ -12165,7 +12165,7 @@
                 </a:solidFill>
                 <a:latin typeface="Consolas" panose="020B0609020204030204" pitchFamily="49" charset="0"/>
               </a:rPr>
-              <a:t>ProductsController</a:t>
+              <a:t>AlbumController</a:t>
             </a:r>
             <a:r>
               <a:rPr lang="en-US" dirty="0">
@@ -12264,7 +12264,31 @@
                 </a:solidFill>
                 <a:latin typeface="Consolas" panose="020B0609020204030204" pitchFamily="49" charset="0"/>
               </a:rPr>
-              <a:t>    public Product Get(int id)</a:t>
+              <a:t>    </a:t>
+            </a:r>
+            <a:r>
+              <a:rPr lang="en-US">
+                <a:solidFill>
+                  <a:schemeClr val="accent2">
+                    <a:lumMod val="40000"/>
+                    <a:lumOff val="60000"/>
+                  </a:schemeClr>
+                </a:solidFill>
+                <a:latin typeface="Consolas" panose="020B0609020204030204" pitchFamily="49" charset="0"/>
+              </a:rPr>
+              <a:t>public Album </a:t>
+            </a:r>
+            <a:r>
+              <a:rPr lang="en-US" dirty="0">
+                <a:solidFill>
+                  <a:schemeClr val="accent2">
+                    <a:lumMod val="40000"/>
+                    <a:lumOff val="60000"/>
+                  </a:schemeClr>
+                </a:solidFill>
+                <a:latin typeface="Consolas" panose="020B0609020204030204" pitchFamily="49" charset="0"/>
+              </a:rPr>
+              <a:t>Get(int id)</a:t>
             </a:r>
           </a:p>
           <a:p>
@@ -12357,7 +12381,7 @@
             <p:ph idx="1"/>
             <p:extLst>
               <p:ext uri="{D42A27DB-BD31-4B8C-83A1-F6EECF244321}">
-                <p14:modId xmlns:p14="http://schemas.microsoft.com/office/powerpoint/2010/main" val="1665604012"/>
+                <p14:modId xmlns:p14="http://schemas.microsoft.com/office/powerpoint/2010/main" val="3591957075"/>
               </p:ext>
             </p:extLst>
           </p:nvPr>
@@ -12429,7 +12453,7 @@
                     <a:p>
                       <a:r>
                         <a:rPr lang="en-US" sz="2800" dirty="0"/>
-                        <a:t>/api/products/5</a:t>
+                        <a:t>/api/Albums/5</a:t>
                       </a:r>
                     </a:p>
                   </a:txBody>
@@ -12462,7 +12486,7 @@
                     <a:p>
                       <a:r>
                         <a:rPr lang="en-US" sz="2800" dirty="0"/>
-                        <a:t>/api/products/5.json</a:t>
+                        <a:t>/api/Albums/5.json</a:t>
                       </a:r>
                     </a:p>
                   </a:txBody>
@@ -12495,7 +12519,7 @@
                     <a:p>
                       <a:r>
                         <a:rPr lang="en-US" sz="2800" dirty="0"/>
-                        <a:t>/api/products/5.xml</a:t>
+                        <a:t>/api/Albums/5.xml</a:t>
                       </a:r>
                     </a:p>
                   </a:txBody>
@@ -12958,16 +12982,21 @@
             <p:ph type="body" idx="1"/>
           </p:nvPr>
         </p:nvSpPr>
-        <p:spPr/>
+        <p:spPr>
+          <a:xfrm>
+            <a:off x="1097279" y="1846052"/>
+            <a:ext cx="6925843" cy="736282"/>
+          </a:xfrm>
+        </p:spPr>
         <p:txBody>
           <a:bodyPr>
-            <a:normAutofit fontScale="92500"/>
+            <a:normAutofit/>
           </a:bodyPr>
           <a:lstStyle/>
           <a:p>
             <a:r>
               <a:rPr lang="en-US" sz="2800" dirty="0"/>
-              <a:t>JSON-formatted Data Response</a:t>
+              <a:t>String-formatted Data Response</a:t>
             </a:r>
           </a:p>
         </p:txBody>
@@ -13121,16 +13150,21 @@
             <p:ph type="body" idx="1"/>
           </p:nvPr>
         </p:nvSpPr>
-        <p:spPr/>
+        <p:spPr>
+          <a:xfrm>
+            <a:off x="1097280" y="1846052"/>
+            <a:ext cx="7810746" cy="736282"/>
+          </a:xfrm>
+        </p:spPr>
         <p:txBody>
           <a:bodyPr>
-            <a:normAutofit fontScale="92500"/>
+            <a:normAutofit/>
           </a:bodyPr>
           <a:lstStyle/>
           <a:p>
             <a:r>
               <a:rPr lang="en-US" sz="2800" dirty="0"/>
-              <a:t>JSON-formatted Data Response</a:t>
+              <a:t>String-formatted Data Response</a:t>
             </a:r>
           </a:p>
         </p:txBody>
@@ -13255,7 +13289,7 @@
           <a:p>
             <a:r>
               <a:rPr lang="en-US" dirty="0"/>
-              <a:t>By default ASP.NET 5 supports the following formats for responses:</a:t>
+              <a:t>By default, ASP.NET 5 supports the following formats for responses:</a:t>
             </a:r>
           </a:p>
         </p:txBody>

</xml_diff>